<commit_message>
Some minor updates and reorg
</commit_message>
<xml_diff>
--- a/TUGAIT 2017 - Pester/TUGAIT 2017 - Introduction to Pester.pptx
+++ b/TUGAIT 2017 - Pester/TUGAIT 2017 - Introduction to Pester.pptx
@@ -4,16 +4,20 @@
   <p:sldMasterIdLst>
     <p:sldMasterId id="2147483648" r:id="rId1"/>
   </p:sldMasterIdLst>
+  <p:notesMasterIdLst>
+    <p:notesMasterId r:id="rId12"/>
+  </p:notesMasterIdLst>
   <p:sldIdLst>
     <p:sldId id="256" r:id="rId2"/>
     <p:sldId id="261" r:id="rId3"/>
     <p:sldId id="262" r:id="rId4"/>
-    <p:sldId id="264" r:id="rId5"/>
-    <p:sldId id="265" r:id="rId6"/>
-    <p:sldId id="263" r:id="rId7"/>
-    <p:sldId id="266" r:id="rId8"/>
-    <p:sldId id="268" r:id="rId9"/>
-    <p:sldId id="267" r:id="rId10"/>
+    <p:sldId id="269" r:id="rId5"/>
+    <p:sldId id="264" r:id="rId6"/>
+    <p:sldId id="265" r:id="rId7"/>
+    <p:sldId id="263" r:id="rId8"/>
+    <p:sldId id="266" r:id="rId9"/>
+    <p:sldId id="268" r:id="rId10"/>
+    <p:sldId id="267" r:id="rId11"/>
   </p:sldIdLst>
   <p:sldSz cx="12192000" cy="6858000"/>
   <p:notesSz cx="6858000" cy="9144000"/>
@@ -120,6 +124,555 @@
 </p:presentation>
 </file>
 
+<file path=ppt/notesMasters/notesMaster1.xml><?xml version="1.0" encoding="utf-8"?>
+<p:notesMaster xmlns:a="http://schemas.openxmlformats.org/drawingml/2006/main" xmlns:r="http://schemas.openxmlformats.org/officeDocument/2006/relationships" xmlns:p="http://schemas.openxmlformats.org/presentationml/2006/main">
+  <p:cSld>
+    <p:bg>
+      <p:bgRef idx="1001">
+        <a:schemeClr val="bg1"/>
+      </p:bgRef>
+    </p:bg>
+    <p:spTree>
+      <p:nvGrpSpPr>
+        <p:cNvPr id="1" name=""/>
+        <p:cNvGrpSpPr/>
+        <p:nvPr/>
+      </p:nvGrpSpPr>
+      <p:grpSpPr>
+        <a:xfrm>
+          <a:off x="0" y="0"/>
+          <a:ext cx="0" cy="0"/>
+          <a:chOff x="0" y="0"/>
+          <a:chExt cx="0" cy="0"/>
+        </a:xfrm>
+      </p:grpSpPr>
+      <p:sp>
+        <p:nvSpPr>
+          <p:cNvPr id="2" name="Header Placeholder 1"/>
+          <p:cNvSpPr>
+            <a:spLocks noGrp="1"/>
+          </p:cNvSpPr>
+          <p:nvPr>
+            <p:ph type="hdr" sz="quarter"/>
+          </p:nvPr>
+        </p:nvSpPr>
+        <p:spPr>
+          <a:xfrm>
+            <a:off x="0" y="0"/>
+            <a:ext cx="2971800" cy="458788"/>
+          </a:xfrm>
+          <a:prstGeom prst="rect">
+            <a:avLst/>
+          </a:prstGeom>
+        </p:spPr>
+        <p:txBody>
+          <a:bodyPr vert="horz" lIns="91440" tIns="45720" rIns="91440" bIns="45720" rtlCol="0"/>
+          <a:lstStyle>
+            <a:lvl1pPr algn="l">
+              <a:defRPr sz="1200"/>
+            </a:lvl1pPr>
+          </a:lstStyle>
+          <a:p>
+            <a:endParaRPr lang="en-GB"/>
+          </a:p>
+        </p:txBody>
+      </p:sp>
+      <p:sp>
+        <p:nvSpPr>
+          <p:cNvPr id="3" name="Date Placeholder 2"/>
+          <p:cNvSpPr>
+            <a:spLocks noGrp="1"/>
+          </p:cNvSpPr>
+          <p:nvPr>
+            <p:ph type="dt" idx="1"/>
+          </p:nvPr>
+        </p:nvSpPr>
+        <p:spPr>
+          <a:xfrm>
+            <a:off x="3884613" y="0"/>
+            <a:ext cx="2971800" cy="458788"/>
+          </a:xfrm>
+          <a:prstGeom prst="rect">
+            <a:avLst/>
+          </a:prstGeom>
+        </p:spPr>
+        <p:txBody>
+          <a:bodyPr vert="horz" lIns="91440" tIns="45720" rIns="91440" bIns="45720" rtlCol="0"/>
+          <a:lstStyle>
+            <a:lvl1pPr algn="r">
+              <a:defRPr sz="1200"/>
+            </a:lvl1pPr>
+          </a:lstStyle>
+          <a:p>
+            <a:fld id="{26835C53-25D9-4FBA-BE0F-50AE2762F010}" type="datetimeFigureOut">
+              <a:rPr lang="en-GB" smtClean="0"/>
+              <a:t>18/05/2017</a:t>
+            </a:fld>
+            <a:endParaRPr lang="en-GB"/>
+          </a:p>
+        </p:txBody>
+      </p:sp>
+      <p:sp>
+        <p:nvSpPr>
+          <p:cNvPr id="4" name="Slide Image Placeholder 3"/>
+          <p:cNvSpPr>
+            <a:spLocks noGrp="1" noRot="1" noChangeAspect="1"/>
+          </p:cNvSpPr>
+          <p:nvPr>
+            <p:ph type="sldImg" idx="2"/>
+          </p:nvPr>
+        </p:nvSpPr>
+        <p:spPr>
+          <a:xfrm>
+            <a:off x="685800" y="1143000"/>
+            <a:ext cx="5486400" cy="3086100"/>
+          </a:xfrm>
+          <a:prstGeom prst="rect">
+            <a:avLst/>
+          </a:prstGeom>
+          <a:noFill/>
+          <a:ln w="12700">
+            <a:solidFill>
+              <a:prstClr val="black"/>
+            </a:solidFill>
+          </a:ln>
+        </p:spPr>
+        <p:txBody>
+          <a:bodyPr vert="horz" lIns="91440" tIns="45720" rIns="91440" bIns="45720" rtlCol="0" anchor="ctr"/>
+          <a:lstStyle/>
+          <a:p>
+            <a:endParaRPr lang="en-GB"/>
+          </a:p>
+        </p:txBody>
+      </p:sp>
+      <p:sp>
+        <p:nvSpPr>
+          <p:cNvPr id="5" name="Notes Placeholder 4"/>
+          <p:cNvSpPr>
+            <a:spLocks noGrp="1"/>
+          </p:cNvSpPr>
+          <p:nvPr>
+            <p:ph type="body" sz="quarter" idx="3"/>
+          </p:nvPr>
+        </p:nvSpPr>
+        <p:spPr>
+          <a:xfrm>
+            <a:off x="685800" y="4400550"/>
+            <a:ext cx="5486400" cy="3600450"/>
+          </a:xfrm>
+          <a:prstGeom prst="rect">
+            <a:avLst/>
+          </a:prstGeom>
+        </p:spPr>
+        <p:txBody>
+          <a:bodyPr vert="horz" lIns="91440" tIns="45720" rIns="91440" bIns="45720" rtlCol="0"/>
+          <a:lstStyle/>
+          <a:p>
+            <a:pPr lvl="0"/>
+            <a:r>
+              <a:rPr lang="en-US"/>
+              <a:t>Edit Master text styles</a:t>
+            </a:r>
+          </a:p>
+          <a:p>
+            <a:pPr lvl="1"/>
+            <a:r>
+              <a:rPr lang="en-US"/>
+              <a:t>Second level</a:t>
+            </a:r>
+          </a:p>
+          <a:p>
+            <a:pPr lvl="2"/>
+            <a:r>
+              <a:rPr lang="en-US"/>
+              <a:t>Third level</a:t>
+            </a:r>
+          </a:p>
+          <a:p>
+            <a:pPr lvl="3"/>
+            <a:r>
+              <a:rPr lang="en-US"/>
+              <a:t>Fourth level</a:t>
+            </a:r>
+          </a:p>
+          <a:p>
+            <a:pPr lvl="4"/>
+            <a:r>
+              <a:rPr lang="en-US"/>
+              <a:t>Fifth level</a:t>
+            </a:r>
+            <a:endParaRPr lang="en-GB"/>
+          </a:p>
+        </p:txBody>
+      </p:sp>
+      <p:sp>
+        <p:nvSpPr>
+          <p:cNvPr id="6" name="Footer Placeholder 5"/>
+          <p:cNvSpPr>
+            <a:spLocks noGrp="1"/>
+          </p:cNvSpPr>
+          <p:nvPr>
+            <p:ph type="ftr" sz="quarter" idx="4"/>
+          </p:nvPr>
+        </p:nvSpPr>
+        <p:spPr>
+          <a:xfrm>
+            <a:off x="0" y="8685213"/>
+            <a:ext cx="2971800" cy="458787"/>
+          </a:xfrm>
+          <a:prstGeom prst="rect">
+            <a:avLst/>
+          </a:prstGeom>
+        </p:spPr>
+        <p:txBody>
+          <a:bodyPr vert="horz" lIns="91440" tIns="45720" rIns="91440" bIns="45720" rtlCol="0" anchor="b"/>
+          <a:lstStyle>
+            <a:lvl1pPr algn="l">
+              <a:defRPr sz="1200"/>
+            </a:lvl1pPr>
+          </a:lstStyle>
+          <a:p>
+            <a:endParaRPr lang="en-GB"/>
+          </a:p>
+        </p:txBody>
+      </p:sp>
+      <p:sp>
+        <p:nvSpPr>
+          <p:cNvPr id="7" name="Slide Number Placeholder 6"/>
+          <p:cNvSpPr>
+            <a:spLocks noGrp="1"/>
+          </p:cNvSpPr>
+          <p:nvPr>
+            <p:ph type="sldNum" sz="quarter" idx="5"/>
+          </p:nvPr>
+        </p:nvSpPr>
+        <p:spPr>
+          <a:xfrm>
+            <a:off x="3884613" y="8685213"/>
+            <a:ext cx="2971800" cy="458787"/>
+          </a:xfrm>
+          <a:prstGeom prst="rect">
+            <a:avLst/>
+          </a:prstGeom>
+        </p:spPr>
+        <p:txBody>
+          <a:bodyPr vert="horz" lIns="91440" tIns="45720" rIns="91440" bIns="45720" rtlCol="0" anchor="b"/>
+          <a:lstStyle>
+            <a:lvl1pPr algn="r">
+              <a:defRPr sz="1200"/>
+            </a:lvl1pPr>
+          </a:lstStyle>
+          <a:p>
+            <a:fld id="{33A7E92C-A6B2-4CD9-A188-8139E6D44A16}" type="slidenum">
+              <a:rPr lang="en-GB" smtClean="0"/>
+              <a:t>‹#›</a:t>
+            </a:fld>
+            <a:endParaRPr lang="en-GB"/>
+          </a:p>
+        </p:txBody>
+      </p:sp>
+    </p:spTree>
+    <p:extLst>
+      <p:ext uri="{BB962C8B-B14F-4D97-AF65-F5344CB8AC3E}">
+        <p14:creationId xmlns:p14="http://schemas.microsoft.com/office/powerpoint/2010/main" val="141388518"/>
+      </p:ext>
+    </p:extLst>
+  </p:cSld>
+  <p:clrMap bg1="lt1" tx1="dk1" bg2="lt2" tx2="dk2" accent1="accent1" accent2="accent2" accent3="accent3" accent4="accent4" accent5="accent5" accent6="accent6" hlink="hlink" folHlink="folHlink"/>
+  <p:notesStyle>
+    <a:lvl1pPr marL="0" algn="l" defTabSz="914400" rtl="0" eaLnBrk="1" latinLnBrk="0" hangingPunct="1">
+      <a:defRPr sz="1200" kern="1200">
+        <a:solidFill>
+          <a:schemeClr val="tx1"/>
+        </a:solidFill>
+        <a:latin typeface="+mn-lt"/>
+        <a:ea typeface="+mn-ea"/>
+        <a:cs typeface="+mn-cs"/>
+      </a:defRPr>
+    </a:lvl1pPr>
+    <a:lvl2pPr marL="457200" algn="l" defTabSz="914400" rtl="0" eaLnBrk="1" latinLnBrk="0" hangingPunct="1">
+      <a:defRPr sz="1200" kern="1200">
+        <a:solidFill>
+          <a:schemeClr val="tx1"/>
+        </a:solidFill>
+        <a:latin typeface="+mn-lt"/>
+        <a:ea typeface="+mn-ea"/>
+        <a:cs typeface="+mn-cs"/>
+      </a:defRPr>
+    </a:lvl2pPr>
+    <a:lvl3pPr marL="914400" algn="l" defTabSz="914400" rtl="0" eaLnBrk="1" latinLnBrk="0" hangingPunct="1">
+      <a:defRPr sz="1200" kern="1200">
+        <a:solidFill>
+          <a:schemeClr val="tx1"/>
+        </a:solidFill>
+        <a:latin typeface="+mn-lt"/>
+        <a:ea typeface="+mn-ea"/>
+        <a:cs typeface="+mn-cs"/>
+      </a:defRPr>
+    </a:lvl3pPr>
+    <a:lvl4pPr marL="1371600" algn="l" defTabSz="914400" rtl="0" eaLnBrk="1" latinLnBrk="0" hangingPunct="1">
+      <a:defRPr sz="1200" kern="1200">
+        <a:solidFill>
+          <a:schemeClr val="tx1"/>
+        </a:solidFill>
+        <a:latin typeface="+mn-lt"/>
+        <a:ea typeface="+mn-ea"/>
+        <a:cs typeface="+mn-cs"/>
+      </a:defRPr>
+    </a:lvl4pPr>
+    <a:lvl5pPr marL="1828800" algn="l" defTabSz="914400" rtl="0" eaLnBrk="1" latinLnBrk="0" hangingPunct="1">
+      <a:defRPr sz="1200" kern="1200">
+        <a:solidFill>
+          <a:schemeClr val="tx1"/>
+        </a:solidFill>
+        <a:latin typeface="+mn-lt"/>
+        <a:ea typeface="+mn-ea"/>
+        <a:cs typeface="+mn-cs"/>
+      </a:defRPr>
+    </a:lvl5pPr>
+    <a:lvl6pPr marL="2286000" algn="l" defTabSz="914400" rtl="0" eaLnBrk="1" latinLnBrk="0" hangingPunct="1">
+      <a:defRPr sz="1200" kern="1200">
+        <a:solidFill>
+          <a:schemeClr val="tx1"/>
+        </a:solidFill>
+        <a:latin typeface="+mn-lt"/>
+        <a:ea typeface="+mn-ea"/>
+        <a:cs typeface="+mn-cs"/>
+      </a:defRPr>
+    </a:lvl6pPr>
+    <a:lvl7pPr marL="2743200" algn="l" defTabSz="914400" rtl="0" eaLnBrk="1" latinLnBrk="0" hangingPunct="1">
+      <a:defRPr sz="1200" kern="1200">
+        <a:solidFill>
+          <a:schemeClr val="tx1"/>
+        </a:solidFill>
+        <a:latin typeface="+mn-lt"/>
+        <a:ea typeface="+mn-ea"/>
+        <a:cs typeface="+mn-cs"/>
+      </a:defRPr>
+    </a:lvl7pPr>
+    <a:lvl8pPr marL="3200400" algn="l" defTabSz="914400" rtl="0" eaLnBrk="1" latinLnBrk="0" hangingPunct="1">
+      <a:defRPr sz="1200" kern="1200">
+        <a:solidFill>
+          <a:schemeClr val="tx1"/>
+        </a:solidFill>
+        <a:latin typeface="+mn-lt"/>
+        <a:ea typeface="+mn-ea"/>
+        <a:cs typeface="+mn-cs"/>
+      </a:defRPr>
+    </a:lvl8pPr>
+    <a:lvl9pPr marL="3657600" algn="l" defTabSz="914400" rtl="0" eaLnBrk="1" latinLnBrk="0" hangingPunct="1">
+      <a:defRPr sz="1200" kern="1200">
+        <a:solidFill>
+          <a:schemeClr val="tx1"/>
+        </a:solidFill>
+        <a:latin typeface="+mn-lt"/>
+        <a:ea typeface="+mn-ea"/>
+        <a:cs typeface="+mn-cs"/>
+      </a:defRPr>
+    </a:lvl9pPr>
+  </p:notesStyle>
+</p:notesMaster>
+</file>
+
+<file path=ppt/notesSlides/notesSlide1.xml><?xml version="1.0" encoding="utf-8"?>
+<p:notes xmlns:a="http://schemas.openxmlformats.org/drawingml/2006/main" xmlns:r="http://schemas.openxmlformats.org/officeDocument/2006/relationships" xmlns:p="http://schemas.openxmlformats.org/presentationml/2006/main">
+  <p:cSld>
+    <p:spTree>
+      <p:nvGrpSpPr>
+        <p:cNvPr id="1" name=""/>
+        <p:cNvGrpSpPr/>
+        <p:nvPr/>
+      </p:nvGrpSpPr>
+      <p:grpSpPr>
+        <a:xfrm>
+          <a:off x="0" y="0"/>
+          <a:ext cx="0" cy="0"/>
+          <a:chOff x="0" y="0"/>
+          <a:chExt cx="0" cy="0"/>
+        </a:xfrm>
+      </p:grpSpPr>
+      <p:sp>
+        <p:nvSpPr>
+          <p:cNvPr id="2" name="Slide Image Placeholder 1"/>
+          <p:cNvSpPr>
+            <a:spLocks noGrp="1" noRot="1" noChangeAspect="1"/>
+          </p:cNvSpPr>
+          <p:nvPr>
+            <p:ph type="sldImg"/>
+          </p:nvPr>
+        </p:nvSpPr>
+        <p:spPr/>
+      </p:sp>
+      <p:sp>
+        <p:nvSpPr>
+          <p:cNvPr id="3" name="Notes Placeholder 2"/>
+          <p:cNvSpPr>
+            <a:spLocks noGrp="1"/>
+          </p:cNvSpPr>
+          <p:nvPr>
+            <p:ph type="body" idx="1"/>
+          </p:nvPr>
+        </p:nvSpPr>
+        <p:spPr/>
+        <p:txBody>
+          <a:bodyPr/>
+          <a:lstStyle/>
+          <a:p>
+            <a:r>
+              <a:rPr lang="en-GB" dirty="0"/>
+              <a:t>Does it do what I want</a:t>
+            </a:r>
+          </a:p>
+          <a:p>
+            <a:r>
+              <a:rPr lang="en-GB" dirty="0"/>
+              <a:t>If I change it does it do what I want</a:t>
+            </a:r>
+          </a:p>
+          <a:p>
+            <a:r>
+              <a:rPr lang="en-GB" dirty="0"/>
+              <a:t>What is it supposed to do</a:t>
+            </a:r>
+          </a:p>
+          <a:p>
+            <a:r>
+              <a:rPr lang="en-GB" dirty="0"/>
+              <a:t>This is how it is designed</a:t>
+            </a:r>
+          </a:p>
+          <a:p>
+            <a:r>
+              <a:rPr lang="en-GB" dirty="0"/>
+              <a:t>Does it still do what we want when we make </a:t>
+            </a:r>
+            <a:r>
+              <a:rPr lang="en-GB"/>
+              <a:t>big changes</a:t>
+            </a:r>
+          </a:p>
+        </p:txBody>
+      </p:sp>
+      <p:sp>
+        <p:nvSpPr>
+          <p:cNvPr id="4" name="Slide Number Placeholder 3"/>
+          <p:cNvSpPr>
+            <a:spLocks noGrp="1"/>
+          </p:cNvSpPr>
+          <p:nvPr>
+            <p:ph type="sldNum" sz="quarter" idx="10"/>
+          </p:nvPr>
+        </p:nvSpPr>
+        <p:spPr/>
+        <p:txBody>
+          <a:bodyPr/>
+          <a:lstStyle/>
+          <a:p>
+            <a:fld id="{33A7E92C-A6B2-4CD9-A188-8139E6D44A16}" type="slidenum">
+              <a:rPr lang="en-GB" smtClean="0"/>
+              <a:t>4</a:t>
+            </a:fld>
+            <a:endParaRPr lang="en-GB"/>
+          </a:p>
+        </p:txBody>
+      </p:sp>
+    </p:spTree>
+    <p:extLst>
+      <p:ext uri="{BB962C8B-B14F-4D97-AF65-F5344CB8AC3E}">
+        <p14:creationId xmlns:p14="http://schemas.microsoft.com/office/powerpoint/2010/main" val="1834118628"/>
+      </p:ext>
+    </p:extLst>
+  </p:cSld>
+  <p:clrMapOvr>
+    <a:masterClrMapping/>
+  </p:clrMapOvr>
+</p:notes>
+</file>
+
+<file path=ppt/notesSlides/notesSlide2.xml><?xml version="1.0" encoding="utf-8"?>
+<p:notes xmlns:a="http://schemas.openxmlformats.org/drawingml/2006/main" xmlns:r="http://schemas.openxmlformats.org/officeDocument/2006/relationships" xmlns:p="http://schemas.openxmlformats.org/presentationml/2006/main">
+  <p:cSld>
+    <p:spTree>
+      <p:nvGrpSpPr>
+        <p:cNvPr id="1" name=""/>
+        <p:cNvGrpSpPr/>
+        <p:nvPr/>
+      </p:nvGrpSpPr>
+      <p:grpSpPr>
+        <a:xfrm>
+          <a:off x="0" y="0"/>
+          <a:ext cx="0" cy="0"/>
+          <a:chOff x="0" y="0"/>
+          <a:chExt cx="0" cy="0"/>
+        </a:xfrm>
+      </p:grpSpPr>
+      <p:sp>
+        <p:nvSpPr>
+          <p:cNvPr id="2" name="Slide Image Placeholder 1"/>
+          <p:cNvSpPr>
+            <a:spLocks noGrp="1" noRot="1" noChangeAspect="1"/>
+          </p:cNvSpPr>
+          <p:nvPr>
+            <p:ph type="sldImg"/>
+          </p:nvPr>
+        </p:nvSpPr>
+        <p:spPr/>
+      </p:sp>
+      <p:sp>
+        <p:nvSpPr>
+          <p:cNvPr id="3" name="Notes Placeholder 2"/>
+          <p:cNvSpPr>
+            <a:spLocks noGrp="1"/>
+          </p:cNvSpPr>
+          <p:nvPr>
+            <p:ph type="body" idx="1"/>
+          </p:nvPr>
+        </p:nvSpPr>
+        <p:spPr/>
+        <p:txBody>
+          <a:bodyPr/>
+          <a:lstStyle/>
+          <a:p>
+            <a:endParaRPr lang="en-GB" dirty="0"/>
+          </a:p>
+        </p:txBody>
+      </p:sp>
+      <p:sp>
+        <p:nvSpPr>
+          <p:cNvPr id="4" name="Slide Number Placeholder 3"/>
+          <p:cNvSpPr>
+            <a:spLocks noGrp="1"/>
+          </p:cNvSpPr>
+          <p:nvPr>
+            <p:ph type="sldNum" sz="quarter" idx="10"/>
+          </p:nvPr>
+        </p:nvSpPr>
+        <p:spPr/>
+        <p:txBody>
+          <a:bodyPr/>
+          <a:lstStyle/>
+          <a:p>
+            <a:fld id="{33A7E92C-A6B2-4CD9-A188-8139E6D44A16}" type="slidenum">
+              <a:rPr lang="en-GB" smtClean="0"/>
+              <a:t>9</a:t>
+            </a:fld>
+            <a:endParaRPr lang="en-GB"/>
+          </a:p>
+        </p:txBody>
+      </p:sp>
+    </p:spTree>
+    <p:extLst>
+      <p:ext uri="{BB962C8B-B14F-4D97-AF65-F5344CB8AC3E}">
+        <p14:creationId xmlns:p14="http://schemas.microsoft.com/office/powerpoint/2010/main" val="3428591185"/>
+      </p:ext>
+    </p:extLst>
+  </p:cSld>
+  <p:clrMapOvr>
+    <a:masterClrMapping/>
+  </p:clrMapOvr>
+</p:notes>
+</file>
+
 <file path=ppt/slideLayouts/slideLayout1.xml><?xml version="1.0" encoding="utf-8"?>
 <p:sldLayout xmlns:a="http://schemas.openxmlformats.org/drawingml/2006/main" xmlns:r="http://schemas.openxmlformats.org/officeDocument/2006/relationships" xmlns:p="http://schemas.openxmlformats.org/presentationml/2006/main" type="title" preserve="1">
   <p:cSld name="Title Slide">
@@ -251,7 +804,7 @@
           <a:p>
             <a:fld id="{0E9FF321-A082-456B-A347-A910A2958839}" type="datetimeFigureOut">
               <a:rPr lang="pt-PT" smtClean="0"/>
-              <a:t>15/05/2017</a:t>
+              <a:t>18/05/2017</a:t>
             </a:fld>
             <a:endParaRPr lang="pt-PT"/>
           </a:p>
@@ -421,7 +974,7 @@
           <a:p>
             <a:fld id="{0E9FF321-A082-456B-A347-A910A2958839}" type="datetimeFigureOut">
               <a:rPr lang="pt-PT" smtClean="0"/>
-              <a:t>15/05/2017</a:t>
+              <a:t>18/05/2017</a:t>
             </a:fld>
             <a:endParaRPr lang="pt-PT"/>
           </a:p>
@@ -601,7 +1154,7 @@
           <a:p>
             <a:fld id="{0E9FF321-A082-456B-A347-A910A2958839}" type="datetimeFigureOut">
               <a:rPr lang="pt-PT" smtClean="0"/>
-              <a:t>15/05/2017</a:t>
+              <a:t>18/05/2017</a:t>
             </a:fld>
             <a:endParaRPr lang="pt-PT"/>
           </a:p>
@@ -771,7 +1324,7 @@
           <a:p>
             <a:fld id="{0E9FF321-A082-456B-A347-A910A2958839}" type="datetimeFigureOut">
               <a:rPr lang="pt-PT" smtClean="0"/>
-              <a:t>15/05/2017</a:t>
+              <a:t>18/05/2017</a:t>
             </a:fld>
             <a:endParaRPr lang="pt-PT"/>
           </a:p>
@@ -1017,7 +1570,7 @@
           <a:p>
             <a:fld id="{0E9FF321-A082-456B-A347-A910A2958839}" type="datetimeFigureOut">
               <a:rPr lang="pt-PT" smtClean="0"/>
-              <a:t>15/05/2017</a:t>
+              <a:t>18/05/2017</a:t>
             </a:fld>
             <a:endParaRPr lang="pt-PT"/>
           </a:p>
@@ -1249,7 +1802,7 @@
           <a:p>
             <a:fld id="{0E9FF321-A082-456B-A347-A910A2958839}" type="datetimeFigureOut">
               <a:rPr lang="pt-PT" smtClean="0"/>
-              <a:t>15/05/2017</a:t>
+              <a:t>18/05/2017</a:t>
             </a:fld>
             <a:endParaRPr lang="pt-PT"/>
           </a:p>
@@ -1616,7 +2169,7 @@
           <a:p>
             <a:fld id="{0E9FF321-A082-456B-A347-A910A2958839}" type="datetimeFigureOut">
               <a:rPr lang="pt-PT" smtClean="0"/>
-              <a:t>15/05/2017</a:t>
+              <a:t>18/05/2017</a:t>
             </a:fld>
             <a:endParaRPr lang="pt-PT"/>
           </a:p>
@@ -1734,7 +2287,7 @@
           <a:p>
             <a:fld id="{0E9FF321-A082-456B-A347-A910A2958839}" type="datetimeFigureOut">
               <a:rPr lang="pt-PT" smtClean="0"/>
-              <a:t>15/05/2017</a:t>
+              <a:t>18/05/2017</a:t>
             </a:fld>
             <a:endParaRPr lang="pt-PT"/>
           </a:p>
@@ -1829,7 +2382,7 @@
           <a:p>
             <a:fld id="{0E9FF321-A082-456B-A347-A910A2958839}" type="datetimeFigureOut">
               <a:rPr lang="pt-PT" smtClean="0"/>
-              <a:t>15/05/2017</a:t>
+              <a:t>18/05/2017</a:t>
             </a:fld>
             <a:endParaRPr lang="pt-PT"/>
           </a:p>
@@ -2106,7 +2659,7 @@
           <a:p>
             <a:fld id="{0E9FF321-A082-456B-A347-A910A2958839}" type="datetimeFigureOut">
               <a:rPr lang="pt-PT" smtClean="0"/>
-              <a:t>15/05/2017</a:t>
+              <a:t>18/05/2017</a:t>
             </a:fld>
             <a:endParaRPr lang="pt-PT"/>
           </a:p>
@@ -2359,7 +2912,7 @@
           <a:p>
             <a:fld id="{0E9FF321-A082-456B-A347-A910A2958839}" type="datetimeFigureOut">
               <a:rPr lang="pt-PT" smtClean="0"/>
-              <a:t>15/05/2017</a:t>
+              <a:t>18/05/2017</a:t>
             </a:fld>
             <a:endParaRPr lang="pt-PT"/>
           </a:p>
@@ -2582,7 +3135,7 @@
           <a:p>
             <a:fld id="{0E9FF321-A082-456B-A347-A910A2958839}" type="datetimeFigureOut">
               <a:rPr lang="pt-PT" smtClean="0"/>
-              <a:t>15/05/2017</a:t>
+              <a:t>18/05/2017</a:t>
             </a:fld>
             <a:endParaRPr lang="pt-PT"/>
           </a:p>
@@ -3488,6 +4041,282 @@
 </p:sld>
 </file>
 
+<file path=ppt/slides/slide10.xml><?xml version="1.0" encoding="utf-8"?>
+<p:sld xmlns:a="http://schemas.openxmlformats.org/drawingml/2006/main" xmlns:r="http://schemas.openxmlformats.org/officeDocument/2006/relationships" xmlns:p="http://schemas.openxmlformats.org/presentationml/2006/main">
+  <p:cSld>
+    <p:bg>
+      <p:bgPr>
+        <a:blipFill dpi="0" rotWithShape="1">
+          <a:blip r:embed="rId2">
+            <a:lum/>
+          </a:blip>
+          <a:srcRect/>
+          <a:stretch>
+            <a:fillRect t="-9000" b="-9000"/>
+          </a:stretch>
+        </a:blipFill>
+        <a:effectLst/>
+      </p:bgPr>
+    </p:bg>
+    <p:spTree>
+      <p:nvGrpSpPr>
+        <p:cNvPr id="1" name=""/>
+        <p:cNvGrpSpPr/>
+        <p:nvPr/>
+      </p:nvGrpSpPr>
+      <p:grpSpPr>
+        <a:xfrm>
+          <a:off x="0" y="0"/>
+          <a:ext cx="0" cy="0"/>
+          <a:chOff x="0" y="0"/>
+          <a:chExt cx="0" cy="0"/>
+        </a:xfrm>
+      </p:grpSpPr>
+      <p:sp>
+        <p:nvSpPr>
+          <p:cNvPr id="12" name="TextBox 11"/>
+          <p:cNvSpPr txBox="1"/>
+          <p:nvPr/>
+        </p:nvSpPr>
+        <p:spPr>
+          <a:xfrm>
+            <a:off x="1732990" y="63995"/>
+            <a:ext cx="8594652" cy="1200329"/>
+          </a:xfrm>
+          <a:prstGeom prst="rect">
+            <a:avLst/>
+          </a:prstGeom>
+          <a:noFill/>
+        </p:spPr>
+        <p:txBody>
+          <a:bodyPr wrap="square" rtlCol="0">
+            <a:spAutoFit/>
+          </a:bodyPr>
+          <a:lstStyle/>
+          <a:p>
+            <a:pPr algn="ctr"/>
+            <a:r>
+              <a:rPr lang="pt-PT" sz="7200" dirty="0">
+                <a:solidFill>
+                  <a:schemeClr val="tx1">
+                    <a:lumMod val="75000"/>
+                    <a:lumOff val="25000"/>
+                  </a:schemeClr>
+                </a:solidFill>
+                <a:latin typeface="Gill Sans MT Condensed" panose="020B0506020104020203" pitchFamily="34" charset="0"/>
+              </a:rPr>
+              <a:t>Questions?</a:t>
+            </a:r>
+          </a:p>
+        </p:txBody>
+      </p:sp>
+      <p:pic>
+        <p:nvPicPr>
+          <p:cNvPr id="19" name="Picture 18"/>
+          <p:cNvPicPr>
+            <a:picLocks noChangeAspect="1"/>
+          </p:cNvPicPr>
+          <p:nvPr/>
+        </p:nvPicPr>
+        <p:blipFill>
+          <a:blip r:embed="rId3">
+            <a:extLst>
+              <a:ext uri="{28A0092B-C50C-407E-A947-70E740481C1C}">
+                <a14:useLocalDpi xmlns:a14="http://schemas.microsoft.com/office/drawing/2010/main" val="0"/>
+              </a:ext>
+            </a:extLst>
+          </a:blip>
+          <a:stretch>
+            <a:fillRect/>
+          </a:stretch>
+        </p:blipFill>
+        <p:spPr>
+          <a:xfrm>
+            <a:off x="11126009" y="5781675"/>
+            <a:ext cx="1088709" cy="1080000"/>
+          </a:xfrm>
+          <a:prstGeom prst="rect">
+            <a:avLst/>
+          </a:prstGeom>
+        </p:spPr>
+      </p:pic>
+      <p:pic>
+        <p:nvPicPr>
+          <p:cNvPr id="5" name="Picture 4"/>
+          <p:cNvPicPr>
+            <a:picLocks noChangeAspect="1"/>
+          </p:cNvPicPr>
+          <p:nvPr/>
+        </p:nvPicPr>
+        <p:blipFill>
+          <a:blip r:embed="rId4">
+            <a:extLst>
+              <a:ext uri="{28A0092B-C50C-407E-A947-70E740481C1C}">
+                <a14:useLocalDpi xmlns:a14="http://schemas.microsoft.com/office/drawing/2010/main" val="0"/>
+              </a:ext>
+            </a:extLst>
+          </a:blip>
+          <a:stretch>
+            <a:fillRect/>
+          </a:stretch>
+        </p:blipFill>
+        <p:spPr>
+          <a:xfrm>
+            <a:off x="1283149" y="1180096"/>
+            <a:ext cx="2980800" cy="4252231"/>
+          </a:xfrm>
+          <a:prstGeom prst="rect">
+            <a:avLst/>
+          </a:prstGeom>
+        </p:spPr>
+      </p:pic>
+      <p:sp>
+        <p:nvSpPr>
+          <p:cNvPr id="2" name="TextBox 1"/>
+          <p:cNvSpPr txBox="1"/>
+          <p:nvPr/>
+        </p:nvSpPr>
+        <p:spPr>
+          <a:xfrm>
+            <a:off x="5116882" y="1327759"/>
+            <a:ext cx="6851738" cy="1477328"/>
+          </a:xfrm>
+          <a:prstGeom prst="rect">
+            <a:avLst/>
+          </a:prstGeom>
+          <a:noFill/>
+        </p:spPr>
+        <p:txBody>
+          <a:bodyPr wrap="square" rtlCol="0">
+            <a:spAutoFit/>
+          </a:bodyPr>
+          <a:lstStyle/>
+          <a:p>
+            <a:r>
+              <a:rPr lang="en-GB" dirty="0"/>
+              <a:t>If you want to more you should get the Pester Book by Adam Bertram</a:t>
+            </a:r>
+          </a:p>
+          <a:p>
+            <a:endParaRPr lang="en-GB" dirty="0"/>
+          </a:p>
+          <a:p>
+            <a:r>
+              <a:rPr lang="en-GB" dirty="0">
+                <a:hlinkClick r:id="rId5"/>
+              </a:rPr>
+              <a:t>https://leanpub.com/pesterbook</a:t>
+            </a:r>
+            <a:r>
+              <a:rPr lang="en-GB" dirty="0"/>
+              <a:t> </a:t>
+            </a:r>
+          </a:p>
+          <a:p>
+            <a:endParaRPr lang="en-GB" dirty="0"/>
+          </a:p>
+          <a:p>
+            <a:endParaRPr lang="en-GB" dirty="0"/>
+          </a:p>
+        </p:txBody>
+      </p:sp>
+      <p:pic>
+        <p:nvPicPr>
+          <p:cNvPr id="1028" name="Picture 4" descr="The Pester Book"/>
+          <p:cNvPicPr>
+            <a:picLocks noChangeAspect="1" noChangeArrowheads="1"/>
+          </p:cNvPicPr>
+          <p:nvPr/>
+        </p:nvPicPr>
+        <p:blipFill>
+          <a:blip r:embed="rId6">
+            <a:extLst>
+              <a:ext uri="{28A0092B-C50C-407E-A947-70E740481C1C}">
+                <a14:useLocalDpi xmlns:a14="http://schemas.microsoft.com/office/drawing/2010/main" val="0"/>
+              </a:ext>
+            </a:extLst>
+          </a:blip>
+          <a:srcRect/>
+          <a:stretch>
+            <a:fillRect/>
+          </a:stretch>
+        </p:blipFill>
+        <p:spPr bwMode="auto">
+          <a:xfrm>
+            <a:off x="8766130" y="1835062"/>
+            <a:ext cx="2509381" cy="3764071"/>
+          </a:xfrm>
+          <a:prstGeom prst="rect">
+            <a:avLst/>
+          </a:prstGeom>
+          <a:noFill/>
+          <a:extLst>
+            <a:ext uri="{909E8E84-426E-40DD-AFC4-6F175D3DCCD1}">
+              <a14:hiddenFill xmlns:a14="http://schemas.microsoft.com/office/drawing/2010/main">
+                <a:solidFill>
+                  <a:srgbClr val="FFFFFF"/>
+                </a:solidFill>
+              </a14:hiddenFill>
+            </a:ext>
+          </a:extLst>
+        </p:spPr>
+      </p:pic>
+      <p:sp>
+        <p:nvSpPr>
+          <p:cNvPr id="3" name="TextBox 2"/>
+          <p:cNvSpPr txBox="1"/>
+          <p:nvPr/>
+        </p:nvSpPr>
+        <p:spPr>
+          <a:xfrm>
+            <a:off x="2198317" y="5505124"/>
+            <a:ext cx="8927692" cy="954107"/>
+          </a:xfrm>
+          <a:prstGeom prst="rect">
+            <a:avLst/>
+          </a:prstGeom>
+          <a:noFill/>
+        </p:spPr>
+        <p:txBody>
+          <a:bodyPr wrap="square" rtlCol="0">
+            <a:spAutoFit/>
+          </a:bodyPr>
+          <a:lstStyle/>
+          <a:p>
+            <a:r>
+              <a:rPr lang="en-GB" sz="2800" dirty="0"/>
+              <a:t>Rob Sewell - 	@</a:t>
+            </a:r>
+            <a:r>
+              <a:rPr lang="en-GB" sz="2800" dirty="0" err="1"/>
+              <a:t>SQLDBAWithBeard</a:t>
+            </a:r>
+            <a:r>
+              <a:rPr lang="en-GB" sz="2800" dirty="0"/>
+              <a:t> </a:t>
+            </a:r>
+          </a:p>
+          <a:p>
+            <a:r>
+              <a:rPr lang="en-GB" sz="2800" dirty="0"/>
+              <a:t>			SQLDBAWithABeard.com</a:t>
+            </a:r>
+          </a:p>
+        </p:txBody>
+      </p:sp>
+    </p:spTree>
+    <p:extLst>
+      <p:ext uri="{BB962C8B-B14F-4D97-AF65-F5344CB8AC3E}">
+        <p14:creationId xmlns:p14="http://schemas.microsoft.com/office/powerpoint/2010/main" val="1809566152"/>
+      </p:ext>
+    </p:extLst>
+  </p:cSld>
+  <p:clrMapOvr>
+    <a:masterClrMapping/>
+  </p:clrMapOvr>
+</p:sld>
+</file>
+
 <file path=ppt/slides/slide2.xml><?xml version="1.0" encoding="utf-8"?>
 <p:sld xmlns:a="http://schemas.openxmlformats.org/drawingml/2006/main" xmlns:r="http://schemas.openxmlformats.org/officeDocument/2006/relationships" xmlns:p="http://schemas.openxmlformats.org/presentationml/2006/main">
   <p:cSld>
@@ -4118,6 +4947,370 @@
     <p:bg>
       <p:bgPr>
         <a:blipFill dpi="0" rotWithShape="1">
+          <a:blip r:embed="rId3">
+            <a:lum/>
+          </a:blip>
+          <a:srcRect/>
+          <a:stretch>
+            <a:fillRect t="-9000" b="-9000"/>
+          </a:stretch>
+        </a:blipFill>
+        <a:effectLst/>
+      </p:bgPr>
+    </p:bg>
+    <p:spTree>
+      <p:nvGrpSpPr>
+        <p:cNvPr id="1" name=""/>
+        <p:cNvGrpSpPr/>
+        <p:nvPr/>
+      </p:nvGrpSpPr>
+      <p:grpSpPr>
+        <a:xfrm>
+          <a:off x="0" y="0"/>
+          <a:ext cx="0" cy="0"/>
+          <a:chOff x="0" y="0"/>
+          <a:chExt cx="0" cy="0"/>
+        </a:xfrm>
+      </p:grpSpPr>
+      <p:sp>
+        <p:nvSpPr>
+          <p:cNvPr id="12" name="TextBox 11"/>
+          <p:cNvSpPr txBox="1"/>
+          <p:nvPr/>
+        </p:nvSpPr>
+        <p:spPr>
+          <a:xfrm>
+            <a:off x="1732990" y="63995"/>
+            <a:ext cx="8594652" cy="1200329"/>
+          </a:xfrm>
+          <a:prstGeom prst="rect">
+            <a:avLst/>
+          </a:prstGeom>
+          <a:noFill/>
+        </p:spPr>
+        <p:txBody>
+          <a:bodyPr wrap="square" rtlCol="0">
+            <a:spAutoFit/>
+          </a:bodyPr>
+          <a:lstStyle/>
+          <a:p>
+            <a:pPr algn="ctr"/>
+            <a:r>
+              <a:rPr lang="pt-PT" sz="7200" dirty="0">
+                <a:solidFill>
+                  <a:schemeClr val="tx1">
+                    <a:lumMod val="75000"/>
+                    <a:lumOff val="25000"/>
+                  </a:schemeClr>
+                </a:solidFill>
+                <a:latin typeface="Gill Sans MT Condensed" panose="020B0506020104020203" pitchFamily="34" charset="0"/>
+              </a:rPr>
+              <a:t>Why Test?</a:t>
+            </a:r>
+          </a:p>
+        </p:txBody>
+      </p:sp>
+      <p:pic>
+        <p:nvPicPr>
+          <p:cNvPr id="19" name="Picture 18"/>
+          <p:cNvPicPr>
+            <a:picLocks noChangeAspect="1"/>
+          </p:cNvPicPr>
+          <p:nvPr/>
+        </p:nvPicPr>
+        <p:blipFill>
+          <a:blip r:embed="rId4">
+            <a:extLst>
+              <a:ext uri="{28A0092B-C50C-407E-A947-70E740481C1C}">
+                <a14:useLocalDpi xmlns:a14="http://schemas.microsoft.com/office/drawing/2010/main" val="0"/>
+              </a:ext>
+            </a:extLst>
+          </a:blip>
+          <a:stretch>
+            <a:fillRect/>
+          </a:stretch>
+        </p:blipFill>
+        <p:spPr>
+          <a:xfrm>
+            <a:off x="11126009" y="5781675"/>
+            <a:ext cx="1088709" cy="1080000"/>
+          </a:xfrm>
+          <a:prstGeom prst="rect">
+            <a:avLst/>
+          </a:prstGeom>
+        </p:spPr>
+      </p:pic>
+      <p:sp>
+        <p:nvSpPr>
+          <p:cNvPr id="9" name="Inhaltsplatzhalter 2"/>
+          <p:cNvSpPr txBox="1">
+            <a:spLocks/>
+          </p:cNvSpPr>
+          <p:nvPr/>
+        </p:nvSpPr>
+        <p:spPr>
+          <a:xfrm>
+            <a:off x="593121" y="908487"/>
+            <a:ext cx="10486149" cy="5385842"/>
+          </a:xfrm>
+          <a:prstGeom prst="rect">
+            <a:avLst/>
+          </a:prstGeom>
+          <a:solidFill>
+            <a:schemeClr val="accent1">
+              <a:lumMod val="40000"/>
+              <a:lumOff val="60000"/>
+              <a:alpha val="29000"/>
+            </a:schemeClr>
+          </a:solidFill>
+        </p:spPr>
+        <p:txBody>
+          <a:bodyPr/>
+          <a:lstStyle>
+            <a:lvl1pPr marL="228600" indent="-228600" algn="l" defTabSz="914400" rtl="0" eaLnBrk="1" latinLnBrk="0" hangingPunct="1">
+              <a:lnSpc>
+                <a:spcPct val="90000"/>
+              </a:lnSpc>
+              <a:spcBef>
+                <a:spcPts val="1000"/>
+              </a:spcBef>
+              <a:buFont typeface="Arial" panose="020B0604020202020204" pitchFamily="34" charset="0"/>
+              <a:buChar char="•"/>
+              <a:defRPr sz="2800" kern="1200">
+                <a:solidFill>
+                  <a:schemeClr val="tx1"/>
+                </a:solidFill>
+                <a:latin typeface="+mn-lt"/>
+                <a:ea typeface="+mn-ea"/>
+                <a:cs typeface="+mn-cs"/>
+              </a:defRPr>
+            </a:lvl1pPr>
+            <a:lvl2pPr marL="685800" indent="-228600" algn="l" defTabSz="914400" rtl="0" eaLnBrk="1" latinLnBrk="0" hangingPunct="1">
+              <a:lnSpc>
+                <a:spcPct val="90000"/>
+              </a:lnSpc>
+              <a:spcBef>
+                <a:spcPts val="500"/>
+              </a:spcBef>
+              <a:buFont typeface="Arial" panose="020B0604020202020204" pitchFamily="34" charset="0"/>
+              <a:buChar char="•"/>
+              <a:defRPr sz="2400" kern="1200">
+                <a:solidFill>
+                  <a:schemeClr val="tx1"/>
+                </a:solidFill>
+                <a:latin typeface="+mn-lt"/>
+                <a:ea typeface="+mn-ea"/>
+                <a:cs typeface="+mn-cs"/>
+              </a:defRPr>
+            </a:lvl2pPr>
+            <a:lvl3pPr marL="1143000" indent="-228600" algn="l" defTabSz="914400" rtl="0" eaLnBrk="1" latinLnBrk="0" hangingPunct="1">
+              <a:lnSpc>
+                <a:spcPct val="90000"/>
+              </a:lnSpc>
+              <a:spcBef>
+                <a:spcPts val="500"/>
+              </a:spcBef>
+              <a:buFont typeface="Arial" panose="020B0604020202020204" pitchFamily="34" charset="0"/>
+              <a:buChar char="•"/>
+              <a:defRPr sz="2000" kern="1200">
+                <a:solidFill>
+                  <a:schemeClr val="tx1"/>
+                </a:solidFill>
+                <a:latin typeface="+mn-lt"/>
+                <a:ea typeface="+mn-ea"/>
+                <a:cs typeface="+mn-cs"/>
+              </a:defRPr>
+            </a:lvl3pPr>
+            <a:lvl4pPr marL="1600200" indent="-228600" algn="l" defTabSz="914400" rtl="0" eaLnBrk="1" latinLnBrk="0" hangingPunct="1">
+              <a:lnSpc>
+                <a:spcPct val="90000"/>
+              </a:lnSpc>
+              <a:spcBef>
+                <a:spcPts val="500"/>
+              </a:spcBef>
+              <a:buFont typeface="Arial" panose="020B0604020202020204" pitchFamily="34" charset="0"/>
+              <a:buChar char="•"/>
+              <a:defRPr sz="1800" kern="1200">
+                <a:solidFill>
+                  <a:schemeClr val="tx1"/>
+                </a:solidFill>
+                <a:latin typeface="+mn-lt"/>
+                <a:ea typeface="+mn-ea"/>
+                <a:cs typeface="+mn-cs"/>
+              </a:defRPr>
+            </a:lvl4pPr>
+            <a:lvl5pPr marL="2057400" indent="-228600" algn="l" defTabSz="914400" rtl="0" eaLnBrk="1" latinLnBrk="0" hangingPunct="1">
+              <a:lnSpc>
+                <a:spcPct val="90000"/>
+              </a:lnSpc>
+              <a:spcBef>
+                <a:spcPts val="500"/>
+              </a:spcBef>
+              <a:buFont typeface="Arial" panose="020B0604020202020204" pitchFamily="34" charset="0"/>
+              <a:buChar char="•"/>
+              <a:defRPr sz="1800" kern="1200">
+                <a:solidFill>
+                  <a:schemeClr val="tx1"/>
+                </a:solidFill>
+                <a:latin typeface="+mn-lt"/>
+                <a:ea typeface="+mn-ea"/>
+                <a:cs typeface="+mn-cs"/>
+              </a:defRPr>
+            </a:lvl5pPr>
+            <a:lvl6pPr marL="2514600" indent="-228600" algn="l" defTabSz="914400" rtl="0" eaLnBrk="1" latinLnBrk="0" hangingPunct="1">
+              <a:lnSpc>
+                <a:spcPct val="90000"/>
+              </a:lnSpc>
+              <a:spcBef>
+                <a:spcPts val="500"/>
+              </a:spcBef>
+              <a:buFont typeface="Arial" panose="020B0604020202020204" pitchFamily="34" charset="0"/>
+              <a:buChar char="•"/>
+              <a:defRPr sz="1800" kern="1200">
+                <a:solidFill>
+                  <a:schemeClr val="tx1"/>
+                </a:solidFill>
+                <a:latin typeface="+mn-lt"/>
+                <a:ea typeface="+mn-ea"/>
+                <a:cs typeface="+mn-cs"/>
+              </a:defRPr>
+            </a:lvl6pPr>
+            <a:lvl7pPr marL="2971800" indent="-228600" algn="l" defTabSz="914400" rtl="0" eaLnBrk="1" latinLnBrk="0" hangingPunct="1">
+              <a:lnSpc>
+                <a:spcPct val="90000"/>
+              </a:lnSpc>
+              <a:spcBef>
+                <a:spcPts val="500"/>
+              </a:spcBef>
+              <a:buFont typeface="Arial" panose="020B0604020202020204" pitchFamily="34" charset="0"/>
+              <a:buChar char="•"/>
+              <a:defRPr sz="1800" kern="1200">
+                <a:solidFill>
+                  <a:schemeClr val="tx1"/>
+                </a:solidFill>
+                <a:latin typeface="+mn-lt"/>
+                <a:ea typeface="+mn-ea"/>
+                <a:cs typeface="+mn-cs"/>
+              </a:defRPr>
+            </a:lvl7pPr>
+            <a:lvl8pPr marL="3429000" indent="-228600" algn="l" defTabSz="914400" rtl="0" eaLnBrk="1" latinLnBrk="0" hangingPunct="1">
+              <a:lnSpc>
+                <a:spcPct val="90000"/>
+              </a:lnSpc>
+              <a:spcBef>
+                <a:spcPts val="500"/>
+              </a:spcBef>
+              <a:buFont typeface="Arial" panose="020B0604020202020204" pitchFamily="34" charset="0"/>
+              <a:buChar char="•"/>
+              <a:defRPr sz="1800" kern="1200">
+                <a:solidFill>
+                  <a:schemeClr val="tx1"/>
+                </a:solidFill>
+                <a:latin typeface="+mn-lt"/>
+                <a:ea typeface="+mn-ea"/>
+                <a:cs typeface="+mn-cs"/>
+              </a:defRPr>
+            </a:lvl8pPr>
+            <a:lvl9pPr marL="3886200" indent="-228600" algn="l" defTabSz="914400" rtl="0" eaLnBrk="1" latinLnBrk="0" hangingPunct="1">
+              <a:lnSpc>
+                <a:spcPct val="90000"/>
+              </a:lnSpc>
+              <a:spcBef>
+                <a:spcPts val="500"/>
+              </a:spcBef>
+              <a:buFont typeface="Arial" panose="020B0604020202020204" pitchFamily="34" charset="0"/>
+              <a:buChar char="•"/>
+              <a:defRPr sz="1800" kern="1200">
+                <a:solidFill>
+                  <a:schemeClr val="tx1"/>
+                </a:solidFill>
+                <a:latin typeface="+mn-lt"/>
+                <a:ea typeface="+mn-ea"/>
+                <a:cs typeface="+mn-cs"/>
+              </a:defRPr>
+            </a:lvl9pPr>
+          </a:lstStyle>
+          <a:p>
+            <a:pPr marL="0" indent="0">
+              <a:buNone/>
+            </a:pPr>
+            <a:r>
+              <a:rPr lang="en-GB" sz="4800" dirty="0"/>
+              <a:t>Good tests can…</a:t>
+            </a:r>
+          </a:p>
+          <a:p>
+            <a:pPr marL="0" indent="0">
+              <a:buNone/>
+            </a:pPr>
+            <a:endParaRPr lang="en-GB" sz="1000" dirty="0"/>
+          </a:p>
+          <a:p>
+            <a:r>
+              <a:rPr lang="en-GB" sz="4800" dirty="0"/>
+              <a:t>Verify the code is working correctly</a:t>
+            </a:r>
+          </a:p>
+          <a:p>
+            <a:r>
+              <a:rPr lang="en-GB" sz="4800" dirty="0"/>
+              <a:t>Prevent future regressions</a:t>
+            </a:r>
+          </a:p>
+          <a:p>
+            <a:r>
+              <a:rPr lang="en-GB" sz="4800" dirty="0"/>
+              <a:t>Document the code’s behaviour</a:t>
+            </a:r>
+          </a:p>
+          <a:p>
+            <a:r>
+              <a:rPr lang="en-GB" sz="4800" dirty="0"/>
+              <a:t>Provide design guidance</a:t>
+            </a:r>
+          </a:p>
+          <a:p>
+            <a:r>
+              <a:rPr lang="en-GB" sz="4800" dirty="0"/>
+              <a:t>Support refactoring</a:t>
+            </a:r>
+          </a:p>
+          <a:p>
+            <a:pPr marL="0" indent="0">
+              <a:buNone/>
+            </a:pPr>
+            <a:r>
+              <a:rPr lang="en-GB" dirty="0">
+                <a:hlinkClick r:id="rId5"/>
+              </a:rPr>
+              <a:t>https://www.devmynd.com/blog/five-factor-testing/</a:t>
+            </a:r>
+            <a:r>
+              <a:rPr lang="en-GB" dirty="0"/>
+              <a:t> </a:t>
+            </a:r>
+          </a:p>
+        </p:txBody>
+      </p:sp>
+    </p:spTree>
+    <p:extLst>
+      <p:ext uri="{BB962C8B-B14F-4D97-AF65-F5344CB8AC3E}">
+        <p14:creationId xmlns:p14="http://schemas.microsoft.com/office/powerpoint/2010/main" val="899732955"/>
+      </p:ext>
+    </p:extLst>
+  </p:cSld>
+  <p:clrMapOvr>
+    <a:masterClrMapping/>
+  </p:clrMapOvr>
+</p:sld>
+</file>
+
+<file path=ppt/slides/slide5.xml><?xml version="1.0" encoding="utf-8"?>
+<p:sld xmlns:a="http://schemas.openxmlformats.org/drawingml/2006/main" xmlns:r="http://schemas.openxmlformats.org/officeDocument/2006/relationships" xmlns:p="http://schemas.openxmlformats.org/presentationml/2006/main">
+  <p:cSld>
+    <p:bg>
+      <p:bgPr>
+        <a:blipFill dpi="0" rotWithShape="1">
           <a:blip r:embed="rId2">
             <a:lum/>
           </a:blip>
@@ -4591,7 +5784,7 @@
 </p:sld>
 </file>
 
-<file path=ppt/slides/slide5.xml><?xml version="1.0" encoding="utf-8"?>
+<file path=ppt/slides/slide6.xml><?xml version="1.0" encoding="utf-8"?>
 <p:sld xmlns:a="http://schemas.openxmlformats.org/drawingml/2006/main" xmlns:r="http://schemas.openxmlformats.org/officeDocument/2006/relationships" xmlns:p="http://schemas.openxmlformats.org/presentationml/2006/main">
   <p:cSld>
     <p:bg>
@@ -4921,7 +6114,7 @@
 </p:sld>
 </file>
 
-<file path=ppt/slides/slide6.xml><?xml version="1.0" encoding="utf-8"?>
+<file path=ppt/slides/slide7.xml><?xml version="1.0" encoding="utf-8"?>
 <p:sld xmlns:a="http://schemas.openxmlformats.org/drawingml/2006/main" xmlns:r="http://schemas.openxmlformats.org/officeDocument/2006/relationships" xmlns:p="http://schemas.openxmlformats.org/presentationml/2006/main">
   <p:cSld>
     <p:bg>
@@ -5310,7 +6503,7 @@
 </p:sld>
 </file>
 
-<file path=ppt/slides/slide7.xml><?xml version="1.0" encoding="utf-8"?>
+<file path=ppt/slides/slide8.xml><?xml version="1.0" encoding="utf-8"?>
 <p:sld xmlns:a="http://schemas.openxmlformats.org/drawingml/2006/main" xmlns:r="http://schemas.openxmlformats.org/officeDocument/2006/relationships" xmlns:p="http://schemas.openxmlformats.org/presentationml/2006/main">
   <p:cSld>
     <p:bg>
@@ -5602,13 +6795,13 @@
 </p:sld>
 </file>
 
-<file path=ppt/slides/slide8.xml><?xml version="1.0" encoding="utf-8"?>
+<file path=ppt/slides/slide9.xml><?xml version="1.0" encoding="utf-8"?>
 <p:sld xmlns:a="http://schemas.openxmlformats.org/drawingml/2006/main" xmlns:r="http://schemas.openxmlformats.org/officeDocument/2006/relationships" xmlns:p="http://schemas.openxmlformats.org/presentationml/2006/main">
   <p:cSld>
     <p:bg>
       <p:bgPr>
         <a:blipFill dpi="0" rotWithShape="1">
-          <a:blip r:embed="rId2">
+          <a:blip r:embed="rId3">
             <a:lum/>
           </a:blip>
           <a:srcRect/>
@@ -5680,7 +6873,7 @@
           <p:nvPr/>
         </p:nvPicPr>
         <p:blipFill>
-          <a:blip r:embed="rId3">
+          <a:blip r:embed="rId4">
             <a:extLst>
               <a:ext uri="{28A0092B-C50C-407E-A947-70E740481C1C}">
                 <a14:useLocalDpi xmlns:a14="http://schemas.microsoft.com/office/drawing/2010/main" val="0"/>
@@ -5781,282 +6974,6 @@
     <p:extLst>
       <p:ext uri="{BB962C8B-B14F-4D97-AF65-F5344CB8AC3E}">
         <p14:creationId xmlns:p14="http://schemas.microsoft.com/office/powerpoint/2010/main" val="1510186156"/>
-      </p:ext>
-    </p:extLst>
-  </p:cSld>
-  <p:clrMapOvr>
-    <a:masterClrMapping/>
-  </p:clrMapOvr>
-</p:sld>
-</file>
-
-<file path=ppt/slides/slide9.xml><?xml version="1.0" encoding="utf-8"?>
-<p:sld xmlns:a="http://schemas.openxmlformats.org/drawingml/2006/main" xmlns:r="http://schemas.openxmlformats.org/officeDocument/2006/relationships" xmlns:p="http://schemas.openxmlformats.org/presentationml/2006/main">
-  <p:cSld>
-    <p:bg>
-      <p:bgPr>
-        <a:blipFill dpi="0" rotWithShape="1">
-          <a:blip r:embed="rId2">
-            <a:lum/>
-          </a:blip>
-          <a:srcRect/>
-          <a:stretch>
-            <a:fillRect t="-9000" b="-9000"/>
-          </a:stretch>
-        </a:blipFill>
-        <a:effectLst/>
-      </p:bgPr>
-    </p:bg>
-    <p:spTree>
-      <p:nvGrpSpPr>
-        <p:cNvPr id="1" name=""/>
-        <p:cNvGrpSpPr/>
-        <p:nvPr/>
-      </p:nvGrpSpPr>
-      <p:grpSpPr>
-        <a:xfrm>
-          <a:off x="0" y="0"/>
-          <a:ext cx="0" cy="0"/>
-          <a:chOff x="0" y="0"/>
-          <a:chExt cx="0" cy="0"/>
-        </a:xfrm>
-      </p:grpSpPr>
-      <p:sp>
-        <p:nvSpPr>
-          <p:cNvPr id="12" name="TextBox 11"/>
-          <p:cNvSpPr txBox="1"/>
-          <p:nvPr/>
-        </p:nvSpPr>
-        <p:spPr>
-          <a:xfrm>
-            <a:off x="1732990" y="63995"/>
-            <a:ext cx="8594652" cy="1200329"/>
-          </a:xfrm>
-          <a:prstGeom prst="rect">
-            <a:avLst/>
-          </a:prstGeom>
-          <a:noFill/>
-        </p:spPr>
-        <p:txBody>
-          <a:bodyPr wrap="square" rtlCol="0">
-            <a:spAutoFit/>
-          </a:bodyPr>
-          <a:lstStyle/>
-          <a:p>
-            <a:pPr algn="ctr"/>
-            <a:r>
-              <a:rPr lang="pt-PT" sz="7200" dirty="0">
-                <a:solidFill>
-                  <a:schemeClr val="tx1">
-                    <a:lumMod val="75000"/>
-                    <a:lumOff val="25000"/>
-                  </a:schemeClr>
-                </a:solidFill>
-                <a:latin typeface="Gill Sans MT Condensed" panose="020B0506020104020203" pitchFamily="34" charset="0"/>
-              </a:rPr>
-              <a:t>Questions?</a:t>
-            </a:r>
-          </a:p>
-        </p:txBody>
-      </p:sp>
-      <p:pic>
-        <p:nvPicPr>
-          <p:cNvPr id="19" name="Picture 18"/>
-          <p:cNvPicPr>
-            <a:picLocks noChangeAspect="1"/>
-          </p:cNvPicPr>
-          <p:nvPr/>
-        </p:nvPicPr>
-        <p:blipFill>
-          <a:blip r:embed="rId3">
-            <a:extLst>
-              <a:ext uri="{28A0092B-C50C-407E-A947-70E740481C1C}">
-                <a14:useLocalDpi xmlns:a14="http://schemas.microsoft.com/office/drawing/2010/main" val="0"/>
-              </a:ext>
-            </a:extLst>
-          </a:blip>
-          <a:stretch>
-            <a:fillRect/>
-          </a:stretch>
-        </p:blipFill>
-        <p:spPr>
-          <a:xfrm>
-            <a:off x="11126009" y="5781675"/>
-            <a:ext cx="1088709" cy="1080000"/>
-          </a:xfrm>
-          <a:prstGeom prst="rect">
-            <a:avLst/>
-          </a:prstGeom>
-        </p:spPr>
-      </p:pic>
-      <p:pic>
-        <p:nvPicPr>
-          <p:cNvPr id="5" name="Picture 4"/>
-          <p:cNvPicPr>
-            <a:picLocks noChangeAspect="1"/>
-          </p:cNvPicPr>
-          <p:nvPr/>
-        </p:nvPicPr>
-        <p:blipFill>
-          <a:blip r:embed="rId4">
-            <a:extLst>
-              <a:ext uri="{28A0092B-C50C-407E-A947-70E740481C1C}">
-                <a14:useLocalDpi xmlns:a14="http://schemas.microsoft.com/office/drawing/2010/main" val="0"/>
-              </a:ext>
-            </a:extLst>
-          </a:blip>
-          <a:stretch>
-            <a:fillRect/>
-          </a:stretch>
-        </p:blipFill>
-        <p:spPr>
-          <a:xfrm>
-            <a:off x="1283149" y="1180096"/>
-            <a:ext cx="2980800" cy="4252231"/>
-          </a:xfrm>
-          <a:prstGeom prst="rect">
-            <a:avLst/>
-          </a:prstGeom>
-        </p:spPr>
-      </p:pic>
-      <p:sp>
-        <p:nvSpPr>
-          <p:cNvPr id="2" name="TextBox 1"/>
-          <p:cNvSpPr txBox="1"/>
-          <p:nvPr/>
-        </p:nvSpPr>
-        <p:spPr>
-          <a:xfrm>
-            <a:off x="5116882" y="1327759"/>
-            <a:ext cx="6851738" cy="1477328"/>
-          </a:xfrm>
-          <a:prstGeom prst="rect">
-            <a:avLst/>
-          </a:prstGeom>
-          <a:noFill/>
-        </p:spPr>
-        <p:txBody>
-          <a:bodyPr wrap="square" rtlCol="0">
-            <a:spAutoFit/>
-          </a:bodyPr>
-          <a:lstStyle/>
-          <a:p>
-            <a:r>
-              <a:rPr lang="en-GB" dirty="0"/>
-              <a:t>If you want to more you should get the Pester Book by Adam Bertram</a:t>
-            </a:r>
-          </a:p>
-          <a:p>
-            <a:endParaRPr lang="en-GB" dirty="0"/>
-          </a:p>
-          <a:p>
-            <a:r>
-              <a:rPr lang="en-GB" dirty="0">
-                <a:hlinkClick r:id="rId5"/>
-              </a:rPr>
-              <a:t>https://leanpub.com/pesterbook</a:t>
-            </a:r>
-            <a:r>
-              <a:rPr lang="en-GB" dirty="0"/>
-              <a:t> </a:t>
-            </a:r>
-          </a:p>
-          <a:p>
-            <a:endParaRPr lang="en-GB" dirty="0"/>
-          </a:p>
-          <a:p>
-            <a:endParaRPr lang="en-GB" dirty="0"/>
-          </a:p>
-        </p:txBody>
-      </p:sp>
-      <p:pic>
-        <p:nvPicPr>
-          <p:cNvPr id="1028" name="Picture 4" descr="The Pester Book"/>
-          <p:cNvPicPr>
-            <a:picLocks noChangeAspect="1" noChangeArrowheads="1"/>
-          </p:cNvPicPr>
-          <p:nvPr/>
-        </p:nvPicPr>
-        <p:blipFill>
-          <a:blip r:embed="rId6">
-            <a:extLst>
-              <a:ext uri="{28A0092B-C50C-407E-A947-70E740481C1C}">
-                <a14:useLocalDpi xmlns:a14="http://schemas.microsoft.com/office/drawing/2010/main" val="0"/>
-              </a:ext>
-            </a:extLst>
-          </a:blip>
-          <a:srcRect/>
-          <a:stretch>
-            <a:fillRect/>
-          </a:stretch>
-        </p:blipFill>
-        <p:spPr bwMode="auto">
-          <a:xfrm>
-            <a:off x="8766130" y="1835062"/>
-            <a:ext cx="2509381" cy="3764071"/>
-          </a:xfrm>
-          <a:prstGeom prst="rect">
-            <a:avLst/>
-          </a:prstGeom>
-          <a:noFill/>
-          <a:extLst>
-            <a:ext uri="{909E8E84-426E-40DD-AFC4-6F175D3DCCD1}">
-              <a14:hiddenFill xmlns:a14="http://schemas.microsoft.com/office/drawing/2010/main">
-                <a:solidFill>
-                  <a:srgbClr val="FFFFFF"/>
-                </a:solidFill>
-              </a14:hiddenFill>
-            </a:ext>
-          </a:extLst>
-        </p:spPr>
-      </p:pic>
-      <p:sp>
-        <p:nvSpPr>
-          <p:cNvPr id="3" name="TextBox 2"/>
-          <p:cNvSpPr txBox="1"/>
-          <p:nvPr/>
-        </p:nvSpPr>
-        <p:spPr>
-          <a:xfrm>
-            <a:off x="2198317" y="5505124"/>
-            <a:ext cx="8927692" cy="954107"/>
-          </a:xfrm>
-          <a:prstGeom prst="rect">
-            <a:avLst/>
-          </a:prstGeom>
-          <a:noFill/>
-        </p:spPr>
-        <p:txBody>
-          <a:bodyPr wrap="square" rtlCol="0">
-            <a:spAutoFit/>
-          </a:bodyPr>
-          <a:lstStyle/>
-          <a:p>
-            <a:r>
-              <a:rPr lang="en-GB" sz="2800" dirty="0"/>
-              <a:t>Rob Sewell - 	@</a:t>
-            </a:r>
-            <a:r>
-              <a:rPr lang="en-GB" sz="2800" dirty="0" err="1"/>
-              <a:t>SQLDBAWithBeard</a:t>
-            </a:r>
-            <a:r>
-              <a:rPr lang="en-GB" sz="2800" dirty="0"/>
-              <a:t> </a:t>
-            </a:r>
-          </a:p>
-          <a:p>
-            <a:r>
-              <a:rPr lang="en-GB" sz="2800" dirty="0"/>
-              <a:t>			SQLDBAWithABeard.com</a:t>
-            </a:r>
-          </a:p>
-        </p:txBody>
-      </p:sp>
-    </p:spTree>
-    <p:extLst>
-      <p:ext uri="{BB962C8B-B14F-4D97-AF65-F5344CB8AC3E}">
-        <p14:creationId xmlns:p14="http://schemas.microsoft.com/office/powerpoint/2010/main" val="1809566152"/>
       </p:ext>
     </p:extLst>
   </p:cSld>
@@ -6359,4 +7276,299 @@
     </a:ext>
   </a:extLst>
 </a:theme>
+</file>
+
+<file path=ppt/theme/theme2.xml><?xml version="1.0" encoding="utf-8"?>
+<a:theme xmlns:a="http://schemas.openxmlformats.org/drawingml/2006/main" name="Office Theme">
+  <a:themeElements>
+    <a:clrScheme name="Office">
+      <a:dk1>
+        <a:sysClr val="windowText" lastClr="000000"/>
+      </a:dk1>
+      <a:lt1>
+        <a:sysClr val="window" lastClr="FFFFFF"/>
+      </a:lt1>
+      <a:dk2>
+        <a:srgbClr val="44546A"/>
+      </a:dk2>
+      <a:lt2>
+        <a:srgbClr val="E7E6E6"/>
+      </a:lt2>
+      <a:accent1>
+        <a:srgbClr val="4472C4"/>
+      </a:accent1>
+      <a:accent2>
+        <a:srgbClr val="ED7D31"/>
+      </a:accent2>
+      <a:accent3>
+        <a:srgbClr val="A5A5A5"/>
+      </a:accent3>
+      <a:accent4>
+        <a:srgbClr val="FFC000"/>
+      </a:accent4>
+      <a:accent5>
+        <a:srgbClr val="5B9BD5"/>
+      </a:accent5>
+      <a:accent6>
+        <a:srgbClr val="70AD47"/>
+      </a:accent6>
+      <a:hlink>
+        <a:srgbClr val="0563C1"/>
+      </a:hlink>
+      <a:folHlink>
+        <a:srgbClr val="954F72"/>
+      </a:folHlink>
+    </a:clrScheme>
+    <a:fontScheme name="Office">
+      <a:majorFont>
+        <a:latin typeface="Calibri Light" panose="020F0302020204030204"/>
+        <a:ea typeface=""/>
+        <a:cs typeface=""/>
+        <a:font script="Jpan" typeface="游ゴシック Light"/>
+        <a:font script="Hang" typeface="맑은 고딕"/>
+        <a:font script="Hans" typeface="等线 Light"/>
+        <a:font script="Hant" typeface="新細明體"/>
+        <a:font script="Arab" typeface="Times New Roman"/>
+        <a:font script="Hebr" typeface="Times New Roman"/>
+        <a:font script="Thai" typeface="Angsana New"/>
+        <a:font script="Ethi" typeface="Nyala"/>
+        <a:font script="Beng" typeface="Vrinda"/>
+        <a:font script="Gujr" typeface="Shruti"/>
+        <a:font script="Khmr" typeface="MoolBoran"/>
+        <a:font script="Knda" typeface="Tunga"/>
+        <a:font script="Guru" typeface="Raavi"/>
+        <a:font script="Cans" typeface="Euphemia"/>
+        <a:font script="Cher" typeface="Plantagenet Cherokee"/>
+        <a:font script="Yiii" typeface="Microsoft Yi Baiti"/>
+        <a:font script="Tibt" typeface="Microsoft Himalaya"/>
+        <a:font script="Thaa" typeface="MV Boli"/>
+        <a:font script="Deva" typeface="Mangal"/>
+        <a:font script="Telu" typeface="Gautami"/>
+        <a:font script="Taml" typeface="Latha"/>
+        <a:font script="Syrc" typeface="Estrangelo Edessa"/>
+        <a:font script="Orya" typeface="Kalinga"/>
+        <a:font script="Mlym" typeface="Kartika"/>
+        <a:font script="Laoo" typeface="DokChampa"/>
+        <a:font script="Sinh" typeface="Iskoola Pota"/>
+        <a:font script="Mong" typeface="Mongolian Baiti"/>
+        <a:font script="Viet" typeface="Times New Roman"/>
+        <a:font script="Uigh" typeface="Microsoft Uighur"/>
+        <a:font script="Geor" typeface="Sylfaen"/>
+        <a:font script="Armn" typeface="Arial"/>
+        <a:font script="Bugi" typeface="Leelawadee UI"/>
+        <a:font script="Bopo" typeface="Microsoft JhengHei"/>
+        <a:font script="Java" typeface="Javanese Text"/>
+        <a:font script="Lisu" typeface="Segoe UI"/>
+        <a:font script="Mymr" typeface="Myanmar Text"/>
+        <a:font script="Nkoo" typeface="Ebrima"/>
+        <a:font script="Olck" typeface="Nirmala UI"/>
+        <a:font script="Osma" typeface="Ebrima"/>
+        <a:font script="Phag" typeface="Phagspa"/>
+        <a:font script="Syrn" typeface="Estrangelo Edessa"/>
+        <a:font script="Syrj" typeface="Estrangelo Edessa"/>
+        <a:font script="Syre" typeface="Estrangelo Edessa"/>
+        <a:font script="Sora" typeface="Nirmala UI"/>
+        <a:font script="Tale" typeface="Microsoft Tai Le"/>
+        <a:font script="Talu" typeface="Microsoft New Tai Lue"/>
+        <a:font script="Tfng" typeface="Ebrima"/>
+      </a:majorFont>
+      <a:minorFont>
+        <a:latin typeface="Calibri" panose="020F0502020204030204"/>
+        <a:ea typeface=""/>
+        <a:cs typeface=""/>
+        <a:font script="Jpan" typeface="游ゴシック"/>
+        <a:font script="Hang" typeface="맑은 고딕"/>
+        <a:font script="Hans" typeface="等线"/>
+        <a:font script="Hant" typeface="新細明體"/>
+        <a:font script="Arab" typeface="Arial"/>
+        <a:font script="Hebr" typeface="Arial"/>
+        <a:font script="Thai" typeface="Cordia New"/>
+        <a:font script="Ethi" typeface="Nyala"/>
+        <a:font script="Beng" typeface="Vrinda"/>
+        <a:font script="Gujr" typeface="Shruti"/>
+        <a:font script="Khmr" typeface="DaunPenh"/>
+        <a:font script="Knda" typeface="Tunga"/>
+        <a:font script="Guru" typeface="Raavi"/>
+        <a:font script="Cans" typeface="Euphemia"/>
+        <a:font script="Cher" typeface="Plantagenet Cherokee"/>
+        <a:font script="Yiii" typeface="Microsoft Yi Baiti"/>
+        <a:font script="Tibt" typeface="Microsoft Himalaya"/>
+        <a:font script="Thaa" typeface="MV Boli"/>
+        <a:font script="Deva" typeface="Mangal"/>
+        <a:font script="Telu" typeface="Gautami"/>
+        <a:font script="Taml" typeface="Latha"/>
+        <a:font script="Syrc" typeface="Estrangelo Edessa"/>
+        <a:font script="Orya" typeface="Kalinga"/>
+        <a:font script="Mlym" typeface="Kartika"/>
+        <a:font script="Laoo" typeface="DokChampa"/>
+        <a:font script="Sinh" typeface="Iskoola Pota"/>
+        <a:font script="Mong" typeface="Mongolian Baiti"/>
+        <a:font script="Viet" typeface="Arial"/>
+        <a:font script="Uigh" typeface="Microsoft Uighur"/>
+        <a:font script="Geor" typeface="Sylfaen"/>
+        <a:font script="Armn" typeface="Arial"/>
+        <a:font script="Bugi" typeface="Leelawadee UI"/>
+        <a:font script="Bopo" typeface="Microsoft JhengHei"/>
+        <a:font script="Java" typeface="Javanese Text"/>
+        <a:font script="Lisu" typeface="Segoe UI"/>
+        <a:font script="Mymr" typeface="Myanmar Text"/>
+        <a:font script="Nkoo" typeface="Ebrima"/>
+        <a:font script="Olck" typeface="Nirmala UI"/>
+        <a:font script="Osma" typeface="Ebrima"/>
+        <a:font script="Phag" typeface="Phagspa"/>
+        <a:font script="Syrn" typeface="Estrangelo Edessa"/>
+        <a:font script="Syrj" typeface="Estrangelo Edessa"/>
+        <a:font script="Syre" typeface="Estrangelo Edessa"/>
+        <a:font script="Sora" typeface="Nirmala UI"/>
+        <a:font script="Tale" typeface="Microsoft Tai Le"/>
+        <a:font script="Talu" typeface="Microsoft New Tai Lue"/>
+        <a:font script="Tfng" typeface="Ebrima"/>
+      </a:minorFont>
+    </a:fontScheme>
+    <a:fmtScheme name="Office">
+      <a:fillStyleLst>
+        <a:solidFill>
+          <a:schemeClr val="phClr"/>
+        </a:solidFill>
+        <a:gradFill rotWithShape="1">
+          <a:gsLst>
+            <a:gs pos="0">
+              <a:schemeClr val="phClr">
+                <a:lumMod val="110000"/>
+                <a:satMod val="105000"/>
+                <a:tint val="67000"/>
+              </a:schemeClr>
+            </a:gs>
+            <a:gs pos="50000">
+              <a:schemeClr val="phClr">
+                <a:lumMod val="105000"/>
+                <a:satMod val="103000"/>
+                <a:tint val="73000"/>
+              </a:schemeClr>
+            </a:gs>
+            <a:gs pos="100000">
+              <a:schemeClr val="phClr">
+                <a:lumMod val="105000"/>
+                <a:satMod val="109000"/>
+                <a:tint val="81000"/>
+              </a:schemeClr>
+            </a:gs>
+          </a:gsLst>
+          <a:lin ang="5400000" scaled="0"/>
+        </a:gradFill>
+        <a:gradFill rotWithShape="1">
+          <a:gsLst>
+            <a:gs pos="0">
+              <a:schemeClr val="phClr">
+                <a:satMod val="103000"/>
+                <a:lumMod val="102000"/>
+                <a:tint val="94000"/>
+              </a:schemeClr>
+            </a:gs>
+            <a:gs pos="50000">
+              <a:schemeClr val="phClr">
+                <a:satMod val="110000"/>
+                <a:lumMod val="100000"/>
+                <a:shade val="100000"/>
+              </a:schemeClr>
+            </a:gs>
+            <a:gs pos="100000">
+              <a:schemeClr val="phClr">
+                <a:lumMod val="99000"/>
+                <a:satMod val="120000"/>
+                <a:shade val="78000"/>
+              </a:schemeClr>
+            </a:gs>
+          </a:gsLst>
+          <a:lin ang="5400000" scaled="0"/>
+        </a:gradFill>
+      </a:fillStyleLst>
+      <a:lnStyleLst>
+        <a:ln w="6350" cap="flat" cmpd="sng" algn="ctr">
+          <a:solidFill>
+            <a:schemeClr val="phClr"/>
+          </a:solidFill>
+          <a:prstDash val="solid"/>
+          <a:miter lim="800000"/>
+        </a:ln>
+        <a:ln w="12700" cap="flat" cmpd="sng" algn="ctr">
+          <a:solidFill>
+            <a:schemeClr val="phClr"/>
+          </a:solidFill>
+          <a:prstDash val="solid"/>
+          <a:miter lim="800000"/>
+        </a:ln>
+        <a:ln w="19050" cap="flat" cmpd="sng" algn="ctr">
+          <a:solidFill>
+            <a:schemeClr val="phClr"/>
+          </a:solidFill>
+          <a:prstDash val="solid"/>
+          <a:miter lim="800000"/>
+        </a:ln>
+      </a:lnStyleLst>
+      <a:effectStyleLst>
+        <a:effectStyle>
+          <a:effectLst/>
+        </a:effectStyle>
+        <a:effectStyle>
+          <a:effectLst/>
+        </a:effectStyle>
+        <a:effectStyle>
+          <a:effectLst>
+            <a:outerShdw blurRad="57150" dist="19050" dir="5400000" algn="ctr" rotWithShape="0">
+              <a:srgbClr val="000000">
+                <a:alpha val="63000"/>
+              </a:srgbClr>
+            </a:outerShdw>
+          </a:effectLst>
+        </a:effectStyle>
+      </a:effectStyleLst>
+      <a:bgFillStyleLst>
+        <a:solidFill>
+          <a:schemeClr val="phClr"/>
+        </a:solidFill>
+        <a:solidFill>
+          <a:schemeClr val="phClr">
+            <a:tint val="95000"/>
+            <a:satMod val="170000"/>
+          </a:schemeClr>
+        </a:solidFill>
+        <a:gradFill rotWithShape="1">
+          <a:gsLst>
+            <a:gs pos="0">
+              <a:schemeClr val="phClr">
+                <a:tint val="93000"/>
+                <a:satMod val="150000"/>
+                <a:shade val="98000"/>
+                <a:lumMod val="102000"/>
+              </a:schemeClr>
+            </a:gs>
+            <a:gs pos="50000">
+              <a:schemeClr val="phClr">
+                <a:tint val="98000"/>
+                <a:satMod val="130000"/>
+                <a:shade val="90000"/>
+                <a:lumMod val="103000"/>
+              </a:schemeClr>
+            </a:gs>
+            <a:gs pos="100000">
+              <a:schemeClr val="phClr">
+                <a:shade val="63000"/>
+                <a:satMod val="120000"/>
+              </a:schemeClr>
+            </a:gs>
+          </a:gsLst>
+          <a:lin ang="5400000" scaled="0"/>
+        </a:gradFill>
+      </a:bgFillStyleLst>
+    </a:fmtScheme>
+  </a:themeElements>
+  <a:objectDefaults/>
+  <a:extraClrSchemeLst/>
+  <a:extLst>
+    <a:ext uri="{05A4C25C-085E-4340-85A3-A5531E510DB2}">
+      <thm15:themeFamily xmlns:thm15="http://schemas.microsoft.com/office/thememl/2012/main" name="Office Theme" id="{62F939B6-93AF-4DB8-9C6B-D6C7DFDC589F}" vid="{4A3C46E8-61CC-4603-A589-7422A47A8E4A}"/>
+    </a:ext>
+  </a:extLst>
+</a:theme>
 </file>
</xml_diff>

<commit_message>
Final changes before session
</commit_message>
<xml_diff>
--- a/TUGAIT 2017 - Pester/TUGAIT 2017 - Introduction to Pester.pptx
+++ b/TUGAIT 2017 - Pester/TUGAIT 2017 - Introduction to Pester.pptx
@@ -206,7 +206,7 @@
           <a:p>
             <a:fld id="{26835C53-25D9-4FBA-BE0F-50AE2762F010}" type="datetimeFigureOut">
               <a:rPr lang="en-GB" smtClean="0"/>
-              <a:t>18/05/2017</a:t>
+              <a:t>20/05/2017</a:t>
             </a:fld>
             <a:endParaRPr lang="en-GB"/>
           </a:p>
@@ -800,7 +800,7 @@
           <a:p>
             <a:fld id="{0E9FF321-A082-456B-A347-A910A2958839}" type="datetimeFigureOut">
               <a:rPr lang="pt-PT" smtClean="0"/>
-              <a:t>18/05/2017</a:t>
+              <a:t>20/05/2017</a:t>
             </a:fld>
             <a:endParaRPr lang="pt-PT"/>
           </a:p>
@@ -970,7 +970,7 @@
           <a:p>
             <a:fld id="{0E9FF321-A082-456B-A347-A910A2958839}" type="datetimeFigureOut">
               <a:rPr lang="pt-PT" smtClean="0"/>
-              <a:t>18/05/2017</a:t>
+              <a:t>20/05/2017</a:t>
             </a:fld>
             <a:endParaRPr lang="pt-PT"/>
           </a:p>
@@ -1150,7 +1150,7 @@
           <a:p>
             <a:fld id="{0E9FF321-A082-456B-A347-A910A2958839}" type="datetimeFigureOut">
               <a:rPr lang="pt-PT" smtClean="0"/>
-              <a:t>18/05/2017</a:t>
+              <a:t>20/05/2017</a:t>
             </a:fld>
             <a:endParaRPr lang="pt-PT"/>
           </a:p>
@@ -1320,7 +1320,7 @@
           <a:p>
             <a:fld id="{0E9FF321-A082-456B-A347-A910A2958839}" type="datetimeFigureOut">
               <a:rPr lang="pt-PT" smtClean="0"/>
-              <a:t>18/05/2017</a:t>
+              <a:t>20/05/2017</a:t>
             </a:fld>
             <a:endParaRPr lang="pt-PT"/>
           </a:p>
@@ -1566,7 +1566,7 @@
           <a:p>
             <a:fld id="{0E9FF321-A082-456B-A347-A910A2958839}" type="datetimeFigureOut">
               <a:rPr lang="pt-PT" smtClean="0"/>
-              <a:t>18/05/2017</a:t>
+              <a:t>20/05/2017</a:t>
             </a:fld>
             <a:endParaRPr lang="pt-PT"/>
           </a:p>
@@ -1798,7 +1798,7 @@
           <a:p>
             <a:fld id="{0E9FF321-A082-456B-A347-A910A2958839}" type="datetimeFigureOut">
               <a:rPr lang="pt-PT" smtClean="0"/>
-              <a:t>18/05/2017</a:t>
+              <a:t>20/05/2017</a:t>
             </a:fld>
             <a:endParaRPr lang="pt-PT"/>
           </a:p>
@@ -2165,7 +2165,7 @@
           <a:p>
             <a:fld id="{0E9FF321-A082-456B-A347-A910A2958839}" type="datetimeFigureOut">
               <a:rPr lang="pt-PT" smtClean="0"/>
-              <a:t>18/05/2017</a:t>
+              <a:t>20/05/2017</a:t>
             </a:fld>
             <a:endParaRPr lang="pt-PT"/>
           </a:p>
@@ -2283,7 +2283,7 @@
           <a:p>
             <a:fld id="{0E9FF321-A082-456B-A347-A910A2958839}" type="datetimeFigureOut">
               <a:rPr lang="pt-PT" smtClean="0"/>
-              <a:t>18/05/2017</a:t>
+              <a:t>20/05/2017</a:t>
             </a:fld>
             <a:endParaRPr lang="pt-PT"/>
           </a:p>
@@ -2378,7 +2378,7 @@
           <a:p>
             <a:fld id="{0E9FF321-A082-456B-A347-A910A2958839}" type="datetimeFigureOut">
               <a:rPr lang="pt-PT" smtClean="0"/>
-              <a:t>18/05/2017</a:t>
+              <a:t>20/05/2017</a:t>
             </a:fld>
             <a:endParaRPr lang="pt-PT"/>
           </a:p>
@@ -2655,7 +2655,7 @@
           <a:p>
             <a:fld id="{0E9FF321-A082-456B-A347-A910A2958839}" type="datetimeFigureOut">
               <a:rPr lang="pt-PT" smtClean="0"/>
-              <a:t>18/05/2017</a:t>
+              <a:t>20/05/2017</a:t>
             </a:fld>
             <a:endParaRPr lang="pt-PT"/>
           </a:p>
@@ -2908,7 +2908,7 @@
           <a:p>
             <a:fld id="{0E9FF321-A082-456B-A347-A910A2958839}" type="datetimeFigureOut">
               <a:rPr lang="pt-PT" smtClean="0"/>
-              <a:t>18/05/2017</a:t>
+              <a:t>20/05/2017</a:t>
             </a:fld>
             <a:endParaRPr lang="pt-PT"/>
           </a:p>
@@ -3131,7 +3131,7 @@
           <a:p>
             <a:fld id="{0E9FF321-A082-456B-A347-A910A2958839}" type="datetimeFigureOut">
               <a:rPr lang="pt-PT" smtClean="0"/>
-              <a:t>18/05/2017</a:t>
+              <a:t>20/05/2017</a:t>
             </a:fld>
             <a:endParaRPr lang="pt-PT"/>
           </a:p>
@@ -4174,8 +4174,8 @@
         </p:nvSpPr>
         <p:spPr>
           <a:xfrm>
-            <a:off x="5116882" y="1327759"/>
-            <a:ext cx="6851738" cy="1477328"/>
+            <a:off x="8133566" y="302933"/>
+            <a:ext cx="4058434" cy="1754326"/>
           </a:xfrm>
           <a:prstGeom prst="rect">
             <a:avLst/>
@@ -4189,8 +4189,12 @@
           <a:lstStyle/>
           <a:p>
             <a:r>
+              <a:rPr lang="en-GB"/>
+              <a:t>You </a:t>
+            </a:r>
+            <a:r>
               <a:rPr lang="en-GB" dirty="0"/>
-              <a:t>If you want to more you should get the Pester Book by Adam Bertram</a:t>
+              <a:t>should get the Pester Book by Adam Bertram</a:t>
             </a:r>
           </a:p>
           <a:p>

</xml_diff>